<commit_message>
Atualizando a versão pdf do e-book
</commit_message>
<xml_diff>
--- a/output/Ebook_SDM_v2.pptx
+++ b/output/Ebook_SDM_v2.pptx
@@ -232,7 +232,7 @@
           <a:p>
             <a:fld id="{6E7514A9-44F5-41E7-969D-F88C4ED95D62}" type="datetimeFigureOut">
               <a:rPr lang="pt-BR" smtClean="0"/>
-              <a:t>13/06/2024</a:t>
+              <a:t>14/06/2024</a:t>
             </a:fld>
             <a:endParaRPr lang="pt-BR"/>
           </a:p>
@@ -630,7 +630,7 @@
           <a:p>
             <a:fld id="{046AC2C9-46C7-45AA-8E69-90819C18FA50}" type="datetime1">
               <a:rPr lang="pt-BR" smtClean="0"/>
-              <a:t>13/06/2024</a:t>
+              <a:t>14/06/2024</a:t>
             </a:fld>
             <a:endParaRPr lang="pt-BR"/>
           </a:p>
@@ -803,7 +803,7 @@
           <a:p>
             <a:fld id="{DD68F2B4-FAF1-487A-910E-E87D6FD60307}" type="datetime1">
               <a:rPr lang="pt-BR" smtClean="0"/>
-              <a:t>13/06/2024</a:t>
+              <a:t>14/06/2024</a:t>
             </a:fld>
             <a:endParaRPr lang="pt-BR"/>
           </a:p>
@@ -986,7 +986,7 @@
           <a:p>
             <a:fld id="{1703E70C-441F-410D-9F48-020CFA4158E3}" type="datetime1">
               <a:rPr lang="pt-BR" smtClean="0"/>
-              <a:t>13/06/2024</a:t>
+              <a:t>14/06/2024</a:t>
             </a:fld>
             <a:endParaRPr lang="pt-BR"/>
           </a:p>
@@ -1159,7 +1159,7 @@
           <a:p>
             <a:fld id="{8E39B3A7-4E74-4FCB-81F5-389F42BF742E}" type="datetime1">
               <a:rPr lang="pt-BR" smtClean="0"/>
-              <a:t>13/06/2024</a:t>
+              <a:t>14/06/2024</a:t>
             </a:fld>
             <a:endParaRPr lang="pt-BR"/>
           </a:p>
@@ -1408,7 +1408,7 @@
           <a:p>
             <a:fld id="{CA047647-2B97-4243-ABF7-81A79B4B4606}" type="datetime1">
               <a:rPr lang="pt-BR" smtClean="0"/>
-              <a:t>13/06/2024</a:t>
+              <a:t>14/06/2024</a:t>
             </a:fld>
             <a:endParaRPr lang="pt-BR"/>
           </a:p>
@@ -1643,7 +1643,7 @@
           <a:p>
             <a:fld id="{3A19FBD9-117F-4527-B3E0-2A97BF64DEEC}" type="datetime1">
               <a:rPr lang="pt-BR" smtClean="0"/>
-              <a:t>13/06/2024</a:t>
+              <a:t>14/06/2024</a:t>
             </a:fld>
             <a:endParaRPr lang="pt-BR"/>
           </a:p>
@@ -2013,7 +2013,7 @@
           <a:p>
             <a:fld id="{86ABC4B1-E6B2-4AD3-AB7C-CC06FB3DE969}" type="datetime1">
               <a:rPr lang="pt-BR" smtClean="0"/>
-              <a:t>13/06/2024</a:t>
+              <a:t>14/06/2024</a:t>
             </a:fld>
             <a:endParaRPr lang="pt-BR"/>
           </a:p>
@@ -2134,7 +2134,7 @@
           <a:p>
             <a:fld id="{94C017B2-080F-488B-88F6-8B88404748D6}" type="datetime1">
               <a:rPr lang="pt-BR" smtClean="0"/>
-              <a:t>13/06/2024</a:t>
+              <a:t>14/06/2024</a:t>
             </a:fld>
             <a:endParaRPr lang="pt-BR"/>
           </a:p>
@@ -2232,7 +2232,7 @@
           <a:p>
             <a:fld id="{22C138F7-A265-453D-8DB3-2A9EE6322B5B}" type="datetime1">
               <a:rPr lang="pt-BR" smtClean="0"/>
-              <a:t>13/06/2024</a:t>
+              <a:t>14/06/2024</a:t>
             </a:fld>
             <a:endParaRPr lang="pt-BR"/>
           </a:p>
@@ -2512,7 +2512,7 @@
           <a:p>
             <a:fld id="{BBFDB18D-B503-4F61-8413-8F8C6A0633E2}" type="datetime1">
               <a:rPr lang="pt-BR" smtClean="0"/>
-              <a:t>13/06/2024</a:t>
+              <a:t>14/06/2024</a:t>
             </a:fld>
             <a:endParaRPr lang="pt-BR"/>
           </a:p>
@@ -2772,7 +2772,7 @@
           <a:p>
             <a:fld id="{87F8475A-14CD-4E76-8A0A-93208B5ED541}" type="datetime1">
               <a:rPr lang="pt-BR" smtClean="0"/>
-              <a:t>13/06/2024</a:t>
+              <a:t>14/06/2024</a:t>
             </a:fld>
             <a:endParaRPr lang="pt-BR"/>
           </a:p>
@@ -2988,7 +2988,7 @@
           <a:p>
             <a:fld id="{A9A6B408-DD6A-488F-9B94-94C05696E6CF}" type="datetime1">
               <a:rPr lang="pt-BR" smtClean="0"/>
-              <a:t>13/06/2024</a:t>
+              <a:t>14/06/2024</a:t>
             </a:fld>
             <a:endParaRPr lang="pt-BR"/>
           </a:p>

</xml_diff>